<commit_message>
Add Figure for RQ1 Case Study
</commit_message>
<xml_diff>
--- a/EH-figures.pptx
+++ b/EH-figures.pptx
@@ -119,12 +119,12 @@
   <p:extLst>
     <p:ext uri="{EFAFB233-063F-42B5-8137-9DF3F51BA10A}">
       <p15:sldGuideLst xmlns:p15="http://schemas.microsoft.com/office/powerpoint/2012/main">
-        <p15:guide id="1" orient="horz" pos="3504" userDrawn="1">
+        <p15:guide id="1" orient="horz" pos="984" userDrawn="1">
           <p15:clr>
             <a:srgbClr val="A4A3A4"/>
           </p15:clr>
         </p15:guide>
-        <p15:guide id="2" pos="3024" userDrawn="1">
+        <p15:guide id="2" pos="816" userDrawn="1">
           <p15:clr>
             <a:srgbClr val="A4A3A4"/>
           </p15:clr>
@@ -35090,76 +35090,64 @@
             </a:pPr>
             <a:r>
               <a:rPr lang="en-US" sz="1800" i="0" u="none" strike="noStrike" dirty="0">
-                <a:solidFill>
-                  <a:srgbClr val="595959"/>
-                </a:solidFill>
                 <a:effectLst/>
                 <a:latin typeface="Arial" panose="020B0604020202020204" pitchFamily="34" charset="0"/>
+                <a:cs typeface="Arial" panose="020B0604020202020204" pitchFamily="34" charset="0"/>
               </a:rPr>
               <a:t>protected Class &lt;&lt; ? &gt; </a:t>
             </a:r>
             <a:r>
               <a:rPr lang="en-US" sz="1800" i="0" u="none" strike="noStrike" dirty="0" err="1">
-                <a:solidFill>
-                  <a:srgbClr val="595959"/>
-                </a:solidFill>
                 <a:effectLst/>
                 <a:latin typeface="Arial" panose="020B0604020202020204" pitchFamily="34" charset="0"/>
+                <a:cs typeface="Arial" panose="020B0604020202020204" pitchFamily="34" charset="0"/>
               </a:rPr>
               <a:t>loadClass</a:t>
             </a:r>
             <a:r>
               <a:rPr lang="en-US" sz="1800" i="0" u="none" strike="noStrike" dirty="0">
-                <a:solidFill>
-                  <a:srgbClr val="595959"/>
-                </a:solidFill>
                 <a:effectLst/>
                 <a:latin typeface="Arial" panose="020B0604020202020204" pitchFamily="34" charset="0"/>
+                <a:cs typeface="Arial" panose="020B0604020202020204" pitchFamily="34" charset="0"/>
               </a:rPr>
               <a:t>(String name, </a:t>
             </a:r>
             <a:r>
               <a:rPr lang="en-US" sz="1800" i="0" u="none" strike="noStrike" dirty="0" err="1">
-                <a:solidFill>
-                  <a:srgbClr val="595959"/>
-                </a:solidFill>
                 <a:effectLst/>
                 <a:latin typeface="Arial" panose="020B0604020202020204" pitchFamily="34" charset="0"/>
+                <a:cs typeface="Arial" panose="020B0604020202020204" pitchFamily="34" charset="0"/>
               </a:rPr>
               <a:t>boolean</a:t>
             </a:r>
             <a:r>
               <a:rPr lang="en-US" sz="1800" i="0" u="none" strike="noStrike" dirty="0">
-                <a:solidFill>
-                  <a:srgbClr val="595959"/>
-                </a:solidFill>
                 <a:effectLst/>
                 <a:latin typeface="Arial" panose="020B0604020202020204" pitchFamily="34" charset="0"/>
+                <a:cs typeface="Arial" panose="020B0604020202020204" pitchFamily="34" charset="0"/>
               </a:rPr>
               <a:t> resolve) throws </a:t>
             </a:r>
             <a:r>
               <a:rPr lang="en-US" sz="1800" i="0" u="none" strike="noStrike" dirty="0" err="1">
-                <a:solidFill>
-                  <a:srgbClr val="595959"/>
-                </a:solidFill>
                 <a:effectLst/>
                 <a:latin typeface="Arial" panose="020B0604020202020204" pitchFamily="34" charset="0"/>
+                <a:cs typeface="Arial" panose="020B0604020202020204" pitchFamily="34" charset="0"/>
               </a:rPr>
               <a:t>ClassNotFoundException</a:t>
             </a:r>
             <a:r>
               <a:rPr lang="en-US" sz="1800" i="0" u="none" strike="noStrike" dirty="0">
-                <a:solidFill>
-                  <a:srgbClr val="595959"/>
-                </a:solidFill>
                 <a:effectLst/>
                 <a:latin typeface="Arial" panose="020B0604020202020204" pitchFamily="34" charset="0"/>
+                <a:cs typeface="Arial" panose="020B0604020202020204" pitchFamily="34" charset="0"/>
               </a:rPr>
               <a:t> {</a:t>
             </a:r>
             <a:endParaRPr lang="en-US" dirty="0">
               <a:effectLst/>
+              <a:latin typeface="Arial" panose="020B0604020202020204" pitchFamily="34" charset="0"/>
+              <a:cs typeface="Arial" panose="020B0604020202020204" pitchFamily="34" charset="0"/>
             </a:endParaRPr>
           </a:p>
           <a:p>
@@ -35173,47 +35161,66 @@
               <a:buNone/>
             </a:pPr>
             <a:r>
-              <a:rPr lang="en-US" sz="1800" i="0" u="none" strike="noStrike" dirty="0">
+              <a:rPr lang="zh-CN" altLang="en-US" sz="1800" i="0" u="none" strike="noStrike" dirty="0">
                 <a:solidFill>
-                  <a:srgbClr val="595959"/>
+                  <a:schemeClr val="accent5">
+                    <a:lumMod val="75000"/>
+                  </a:schemeClr>
                 </a:solidFill>
                 <a:effectLst/>
                 <a:latin typeface="Arial" panose="020B0604020202020204" pitchFamily="34" charset="0"/>
+                <a:cs typeface="Arial" panose="020B0604020202020204" pitchFamily="34" charset="0"/>
               </a:rPr>
-              <a:t>   </a:t>
+              <a:t> </a:t>
             </a:r>
             <a:r>
               <a:rPr lang="en-US" sz="1800" i="0" u="none" strike="noStrike" dirty="0">
                 <a:solidFill>
-                  <a:srgbClr val="4285F4"/>
+                  <a:schemeClr val="accent5">
+                    <a:lumMod val="75000"/>
+                  </a:schemeClr>
                 </a:solidFill>
                 <a:effectLst/>
                 <a:latin typeface="Arial" panose="020B0604020202020204" pitchFamily="34" charset="0"/>
+                <a:cs typeface="Arial" panose="020B0604020202020204" pitchFamily="34" charset="0"/>
               </a:rPr>
-              <a:t> if (</a:t>
+              <a:t>   if (</a:t>
             </a:r>
             <a:r>
               <a:rPr lang="en-US" sz="1800" i="0" u="none" strike="noStrike" dirty="0" err="1">
                 <a:solidFill>
-                  <a:srgbClr val="4285F4"/>
+                  <a:schemeClr val="accent5">
+                    <a:lumMod val="75000"/>
+                  </a:schemeClr>
                 </a:solidFill>
                 <a:effectLst/>
                 <a:latin typeface="Arial" panose="020B0604020202020204" pitchFamily="34" charset="0"/>
+                <a:cs typeface="Arial" panose="020B0604020202020204" pitchFamily="34" charset="0"/>
               </a:rPr>
               <a:t>name.startsWith</a:t>
             </a:r>
             <a:r>
               <a:rPr lang="en-US" sz="1800" i="0" u="none" strike="noStrike" dirty="0">
                 <a:solidFill>
-                  <a:srgbClr val="4285F4"/>
+                  <a:schemeClr val="accent5">
+                    <a:lumMod val="75000"/>
+                  </a:schemeClr>
                 </a:solidFill>
                 <a:effectLst/>
                 <a:latin typeface="Arial" panose="020B0604020202020204" pitchFamily="34" charset="0"/>
+                <a:cs typeface="Arial" panose="020B0604020202020204" pitchFamily="34" charset="0"/>
               </a:rPr>
               <a:t>(Test.class.getName())) {</a:t>
             </a:r>
             <a:endParaRPr lang="en-US" dirty="0">
+              <a:solidFill>
+                <a:schemeClr val="accent5">
+                  <a:lumMod val="75000"/>
+                </a:schemeClr>
+              </a:solidFill>
               <a:effectLst/>
+              <a:latin typeface="Arial" panose="020B0604020202020204" pitchFamily="34" charset="0"/>
+              <a:cs typeface="Arial" panose="020B0604020202020204" pitchFamily="34" charset="0"/>
             </a:endParaRPr>
           </a:p>
           <a:p>
@@ -35227,47 +35234,66 @@
               <a:buNone/>
             </a:pPr>
             <a:r>
-              <a:rPr lang="en-US" sz="1800" i="0" u="none" strike="noStrike" dirty="0">
+              <a:rPr lang="zh-CN" altLang="en-US" sz="1800" i="0" u="none" strike="noStrike" dirty="0">
                 <a:solidFill>
-                  <a:srgbClr val="595959"/>
+                  <a:schemeClr val="accent5">
+                    <a:lumMod val="75000"/>
+                  </a:schemeClr>
                 </a:solidFill>
                 <a:effectLst/>
                 <a:latin typeface="Arial" panose="020B0604020202020204" pitchFamily="34" charset="0"/>
+                <a:cs typeface="Arial" panose="020B0604020202020204" pitchFamily="34" charset="0"/>
               </a:rPr>
-              <a:t>        </a:t>
+              <a:t>  </a:t>
             </a:r>
             <a:r>
               <a:rPr lang="en-US" sz="1800" i="0" u="none" strike="noStrike" dirty="0">
                 <a:solidFill>
-                  <a:srgbClr val="4285F4"/>
+                  <a:schemeClr val="accent5">
+                    <a:lumMod val="75000"/>
+                  </a:schemeClr>
                 </a:solidFill>
                 <a:effectLst/>
                 <a:latin typeface="Arial" panose="020B0604020202020204" pitchFamily="34" charset="0"/>
+                <a:cs typeface="Arial" panose="020B0604020202020204" pitchFamily="34" charset="0"/>
               </a:rPr>
-              <a:t>Class &lt;&lt; ? &gt; c = </a:t>
+              <a:t>      Class &lt;&lt; ? &gt; c = </a:t>
             </a:r>
             <a:r>
               <a:rPr lang="en-US" sz="1800" i="0" u="none" strike="noStrike" dirty="0" err="1">
                 <a:solidFill>
-                  <a:srgbClr val="4285F4"/>
+                  <a:schemeClr val="accent5">
+                    <a:lumMod val="75000"/>
+                  </a:schemeClr>
                 </a:solidFill>
                 <a:effectLst/>
                 <a:latin typeface="Arial" panose="020B0604020202020204" pitchFamily="34" charset="0"/>
+                <a:cs typeface="Arial" panose="020B0604020202020204" pitchFamily="34" charset="0"/>
               </a:rPr>
               <a:t>findLoadedClass</a:t>
             </a:r>
             <a:r>
               <a:rPr lang="en-US" sz="1800" i="0" u="none" strike="noStrike" dirty="0">
                 <a:solidFill>
-                  <a:srgbClr val="4285F4"/>
+                  <a:schemeClr val="accent5">
+                    <a:lumMod val="75000"/>
+                  </a:schemeClr>
                 </a:solidFill>
                 <a:effectLst/>
                 <a:latin typeface="Arial" panose="020B0604020202020204" pitchFamily="34" charset="0"/>
+                <a:cs typeface="Arial" panose="020B0604020202020204" pitchFamily="34" charset="0"/>
               </a:rPr>
               <a:t>(name);</a:t>
             </a:r>
             <a:endParaRPr lang="en-US" dirty="0">
+              <a:solidFill>
+                <a:schemeClr val="accent5">
+                  <a:lumMod val="75000"/>
+                </a:schemeClr>
+              </a:solidFill>
               <a:effectLst/>
+              <a:latin typeface="Arial" panose="020B0604020202020204" pitchFamily="34" charset="0"/>
+              <a:cs typeface="Arial" panose="020B0604020202020204" pitchFamily="34" charset="0"/>
             </a:endParaRPr>
           </a:p>
           <a:p>
@@ -35281,27 +35307,40 @@
               <a:buNone/>
             </a:pPr>
             <a:r>
-              <a:rPr lang="en-US" sz="1800" i="0" u="none" strike="noStrike" dirty="0">
+              <a:rPr lang="zh-CN" altLang="en-US" sz="1800" i="0" u="none" strike="noStrike" dirty="0">
                 <a:solidFill>
-                  <a:srgbClr val="595959"/>
+                  <a:schemeClr val="accent5">
+                    <a:lumMod val="75000"/>
+                  </a:schemeClr>
                 </a:solidFill>
                 <a:effectLst/>
                 <a:latin typeface="Arial" panose="020B0604020202020204" pitchFamily="34" charset="0"/>
+                <a:cs typeface="Arial" panose="020B0604020202020204" pitchFamily="34" charset="0"/>
               </a:rPr>
-              <a:t>      </a:t>
+              <a:t>  </a:t>
             </a:r>
             <a:r>
               <a:rPr lang="en-US" sz="1800" i="0" u="none" strike="noStrike" dirty="0">
                 <a:solidFill>
-                  <a:srgbClr val="4285F4"/>
+                  <a:schemeClr val="accent5">
+                    <a:lumMod val="75000"/>
+                  </a:schemeClr>
                 </a:solidFill>
                 <a:effectLst/>
                 <a:latin typeface="Arial" panose="020B0604020202020204" pitchFamily="34" charset="0"/>
+                <a:cs typeface="Arial" panose="020B0604020202020204" pitchFamily="34" charset="0"/>
               </a:rPr>
-              <a:t>  if (c != null) {</a:t>
+              <a:t>      if (c != null) {</a:t>
             </a:r>
             <a:endParaRPr lang="en-US" dirty="0">
+              <a:solidFill>
+                <a:schemeClr val="accent5">
+                  <a:lumMod val="75000"/>
+                </a:schemeClr>
+              </a:solidFill>
               <a:effectLst/>
+              <a:latin typeface="Arial" panose="020B0604020202020204" pitchFamily="34" charset="0"/>
+              <a:cs typeface="Arial" panose="020B0604020202020204" pitchFamily="34" charset="0"/>
             </a:endParaRPr>
           </a:p>
           <a:p>
@@ -35315,27 +35354,40 @@
               <a:buNone/>
             </a:pPr>
             <a:r>
-              <a:rPr lang="en-US" sz="1800" i="0" u="none" strike="noStrike" dirty="0">
+              <a:rPr lang="zh-CN" altLang="en-US" sz="1800" i="0" u="none" strike="noStrike" dirty="0">
                 <a:solidFill>
-                  <a:srgbClr val="595959"/>
+                  <a:schemeClr val="accent5">
+                    <a:lumMod val="75000"/>
+                  </a:schemeClr>
                 </a:solidFill>
                 <a:effectLst/>
                 <a:latin typeface="Arial" panose="020B0604020202020204" pitchFamily="34" charset="0"/>
+                <a:cs typeface="Arial" panose="020B0604020202020204" pitchFamily="34" charset="0"/>
               </a:rPr>
-              <a:t>            </a:t>
+              <a:t>  </a:t>
             </a:r>
             <a:r>
               <a:rPr lang="en-US" sz="1800" i="0" u="none" strike="noStrike" dirty="0">
                 <a:solidFill>
-                  <a:srgbClr val="4285F4"/>
+                  <a:schemeClr val="accent5">
+                    <a:lumMod val="75000"/>
+                  </a:schemeClr>
                 </a:solidFill>
                 <a:effectLst/>
                 <a:latin typeface="Arial" panose="020B0604020202020204" pitchFamily="34" charset="0"/>
+                <a:cs typeface="Arial" panose="020B0604020202020204" pitchFamily="34" charset="0"/>
               </a:rPr>
-              <a:t>return c;</a:t>
+              <a:t>          return c;</a:t>
             </a:r>
             <a:endParaRPr lang="en-US" dirty="0">
+              <a:solidFill>
+                <a:schemeClr val="accent5">
+                  <a:lumMod val="75000"/>
+                </a:schemeClr>
+              </a:solidFill>
               <a:effectLst/>
+              <a:latin typeface="Arial" panose="020B0604020202020204" pitchFamily="34" charset="0"/>
+              <a:cs typeface="Arial" panose="020B0604020202020204" pitchFamily="34" charset="0"/>
             </a:endParaRPr>
           </a:p>
           <a:p>
@@ -35349,17 +35401,40 @@
               <a:buNone/>
             </a:pPr>
             <a:r>
-              <a:rPr lang="en-US" sz="1800" i="0" u="none" strike="noStrike" dirty="0">
+              <a:rPr lang="zh-CN" altLang="en-US" sz="1800" i="0" u="none" strike="noStrike" dirty="0">
                 <a:solidFill>
-                  <a:srgbClr val="4285F4"/>
+                  <a:schemeClr val="accent5">
+                    <a:lumMod val="75000"/>
+                  </a:schemeClr>
                 </a:solidFill>
                 <a:effectLst/>
                 <a:latin typeface="Arial" panose="020B0604020202020204" pitchFamily="34" charset="0"/>
+                <a:cs typeface="Arial" panose="020B0604020202020204" pitchFamily="34" charset="0"/>
               </a:rPr>
-              <a:t>        }</a:t>
+              <a:t>  </a:t>
+            </a:r>
+            <a:r>
+              <a:rPr lang="en-US" sz="1800" i="0" u="none" strike="noStrike" dirty="0">
+                <a:solidFill>
+                  <a:schemeClr val="accent5">
+                    <a:lumMod val="75000"/>
+                  </a:schemeClr>
+                </a:solidFill>
+                <a:effectLst/>
+                <a:latin typeface="Arial" panose="020B0604020202020204" pitchFamily="34" charset="0"/>
+                <a:cs typeface="Arial" panose="020B0604020202020204" pitchFamily="34" charset="0"/>
+              </a:rPr>
+              <a:t>      }</a:t>
             </a:r>
             <a:endParaRPr lang="en-US" dirty="0">
+              <a:solidFill>
+                <a:schemeClr val="accent5">
+                  <a:lumMod val="75000"/>
+                </a:schemeClr>
+              </a:solidFill>
               <a:effectLst/>
+              <a:latin typeface="Arial" panose="020B0604020202020204" pitchFamily="34" charset="0"/>
+              <a:cs typeface="Arial" panose="020B0604020202020204" pitchFamily="34" charset="0"/>
             </a:endParaRPr>
           </a:p>
           <a:p>
@@ -35373,17 +35448,60 @@
               <a:buNone/>
             </a:pPr>
             <a:r>
+              <a:rPr lang="zh-CN" altLang="en-US" sz="1800" dirty="0">
+                <a:latin typeface="Arial" panose="020B0604020202020204" pitchFamily="34" charset="0"/>
+                <a:cs typeface="Arial" panose="020B0604020202020204" pitchFamily="34" charset="0"/>
+              </a:rPr>
+              <a:t> </a:t>
+            </a:r>
+            <a:r>
+              <a:rPr lang="zh-CN" altLang="en-US" sz="1800" dirty="0">
+                <a:solidFill>
+                  <a:schemeClr val="accent2">
+                    <a:lumMod val="75000"/>
+                  </a:schemeClr>
+                </a:solidFill>
+                <a:latin typeface="Arial" panose="020B0604020202020204" pitchFamily="34" charset="0"/>
+                <a:cs typeface="Arial" panose="020B0604020202020204" pitchFamily="34" charset="0"/>
+              </a:rPr>
+              <a:t> </a:t>
+            </a:r>
+            <a:r>
+              <a:rPr lang="en-US" sz="1800" i="0" u="none" strike="noStrike" dirty="0">
+                <a:solidFill>
+                  <a:schemeClr val="accent2">
+                    <a:lumMod val="75000"/>
+                  </a:schemeClr>
+                </a:solidFill>
+                <a:effectLst/>
+                <a:latin typeface="Arial" panose="020B0604020202020204" pitchFamily="34" charset="0"/>
+                <a:cs typeface="Arial" panose="020B0604020202020204" pitchFamily="34" charset="0"/>
+              </a:rPr>
+              <a:t> </a:t>
+            </a:r>
+            <a:r>
               <a:rPr lang="en-US" sz="1800" i="0" u="none" strike="noStrike" dirty="0">
                 <a:solidFill>
                   <a:srgbClr val="595959"/>
                 </a:solidFill>
                 <a:effectLst/>
                 <a:latin typeface="Arial" panose="020B0604020202020204" pitchFamily="34" charset="0"/>
+                <a:cs typeface="Arial" panose="020B0604020202020204" pitchFamily="34" charset="0"/>
               </a:rPr>
-              <a:t>        try {</a:t>
+              <a:t>    </a:t>
+            </a:r>
+            <a:r>
+              <a:rPr lang="en-US" sz="1800" i="0" u="none" strike="noStrike" dirty="0">
+                <a:effectLst/>
+                <a:latin typeface="Arial" panose="020B0604020202020204" pitchFamily="34" charset="0"/>
+                <a:cs typeface="Arial" panose="020B0604020202020204" pitchFamily="34" charset="0"/>
+              </a:rPr>
+              <a:t> try {</a:t>
             </a:r>
             <a:endParaRPr lang="en-US" dirty="0">
               <a:effectLst/>
+              <a:latin typeface="Arial" panose="020B0604020202020204" pitchFamily="34" charset="0"/>
+              <a:cs typeface="Arial" panose="020B0604020202020204" pitchFamily="34" charset="0"/>
             </a:endParaRPr>
           </a:p>
           <a:p>
@@ -35397,27 +35515,61 @@
               <a:buNone/>
             </a:pPr>
             <a:r>
-              <a:rPr lang="en-US" sz="1800" i="0" u="none" strike="noStrike" dirty="0">
+              <a:rPr lang="zh-CN" altLang="en-US" sz="1800" i="0" u="none" strike="noStrike" dirty="0">
+                <a:effectLst/>
+                <a:latin typeface="Arial" panose="020B0604020202020204" pitchFamily="34" charset="0"/>
+                <a:cs typeface="Arial" panose="020B0604020202020204" pitchFamily="34" charset="0"/>
+              </a:rPr>
+              <a:t> </a:t>
+            </a:r>
+            <a:r>
+              <a:rPr lang="zh-CN" altLang="en-US" sz="1800" i="0" u="none" strike="noStrike" dirty="0">
                 <a:solidFill>
-                  <a:srgbClr val="595959"/>
+                  <a:schemeClr val="accent2">
+                    <a:lumMod val="75000"/>
+                  </a:schemeClr>
                 </a:solidFill>
                 <a:effectLst/>
                 <a:latin typeface="Arial" panose="020B0604020202020204" pitchFamily="34" charset="0"/>
+                <a:cs typeface="Arial" panose="020B0604020202020204" pitchFamily="34" charset="0"/>
               </a:rPr>
-              <a:t>    </a:t>
+              <a:t> </a:t>
             </a:r>
             <a:r>
               <a:rPr lang="en-US" sz="1800" i="0" u="none" strike="noStrike" dirty="0">
                 <a:solidFill>
-                  <a:srgbClr val="4285F4"/>
+                  <a:schemeClr val="accent2">
+                    <a:lumMod val="75000"/>
+                  </a:schemeClr>
                 </a:solidFill>
                 <a:effectLst/>
                 <a:latin typeface="Arial" panose="020B0604020202020204" pitchFamily="34" charset="0"/>
+                <a:cs typeface="Arial" panose="020B0604020202020204" pitchFamily="34" charset="0"/>
               </a:rPr>
-              <a:t>        COUNTER++;</a:t>
+              <a:t>         </a:t>
+            </a:r>
+            <a:r>
+              <a:rPr lang="en-US" sz="1800" i="0" u="none" strike="noStrike" dirty="0">
+                <a:solidFill>
+                  <a:schemeClr val="accent5">
+                    <a:lumMod val="75000"/>
+                  </a:schemeClr>
+                </a:solidFill>
+                <a:effectLst/>
+                <a:latin typeface="Arial" panose="020B0604020202020204" pitchFamily="34" charset="0"/>
+                <a:cs typeface="Arial" panose="020B0604020202020204" pitchFamily="34" charset="0"/>
+              </a:rPr>
+              <a:t> COUNTER++;</a:t>
             </a:r>
             <a:endParaRPr lang="en-US" dirty="0">
+              <a:solidFill>
+                <a:schemeClr val="accent5">
+                  <a:lumMod val="75000"/>
+                </a:schemeClr>
+              </a:solidFill>
               <a:effectLst/>
+              <a:latin typeface="Arial" panose="020B0604020202020204" pitchFamily="34" charset="0"/>
+              <a:cs typeface="Arial" panose="020B0604020202020204" pitchFamily="34" charset="0"/>
             </a:endParaRPr>
           </a:p>
           <a:p>
@@ -35431,97 +35583,143 @@
               <a:buNone/>
             </a:pPr>
             <a:r>
-              <a:rPr lang="en-US" sz="1800" i="0" u="none" strike="noStrike" dirty="0">
+              <a:rPr lang="zh-CN" altLang="en-US" sz="1800" i="0" u="none" strike="noStrike" dirty="0">
                 <a:solidFill>
-                  <a:srgbClr val="4285F4"/>
+                  <a:schemeClr val="accent5">
+                    <a:lumMod val="75000"/>
+                  </a:schemeClr>
                 </a:solidFill>
                 <a:effectLst/>
                 <a:latin typeface="Arial" panose="020B0604020202020204" pitchFamily="34" charset="0"/>
+                <a:cs typeface="Arial" panose="020B0604020202020204" pitchFamily="34" charset="0"/>
               </a:rPr>
-              <a:t>            </a:t>
-            </a:r>
-            <a:r>
-              <a:rPr lang="en-US" sz="1800" i="0" u="none" strike="noStrike" dirty="0" err="1">
+              <a:t>  </a:t>
+            </a:r>
+            <a:r>
+              <a:rPr lang="en-US" sz="1800" i="0" u="none" strike="noStrike" dirty="0">
                 <a:solidFill>
-                  <a:srgbClr val="4285F4"/>
+                  <a:schemeClr val="accent5">
+                    <a:lumMod val="75000"/>
+                  </a:schemeClr>
                 </a:solidFill>
                 <a:effectLst/>
                 <a:latin typeface="Arial" panose="020B0604020202020204" pitchFamily="34" charset="0"/>
+                <a:cs typeface="Arial" panose="020B0604020202020204" pitchFamily="34" charset="0"/>
               </a:rPr>
-              <a:t>InputStream</a:t>
-            </a:r>
-            <a:r>
-              <a:rPr lang="en-US" sz="1800" i="0" u="none" strike="noStrike" dirty="0">
+              <a:t>          </a:t>
+            </a:r>
+            <a:r>
+              <a:rPr lang="en-US" sz="1800" i="0" u="none" strike="noStrike" dirty="0" err="1">
                 <a:solidFill>
-                  <a:srgbClr val="4285F4"/>
+                  <a:schemeClr val="accent5">
+                    <a:lumMod val="75000"/>
+                  </a:schemeClr>
                 </a:solidFill>
                 <a:effectLst/>
                 <a:latin typeface="Arial" panose="020B0604020202020204" pitchFamily="34" charset="0"/>
+                <a:cs typeface="Arial" panose="020B0604020202020204" pitchFamily="34" charset="0"/>
               </a:rPr>
-              <a:t> in = </a:t>
-            </a:r>
-            <a:r>
-              <a:rPr lang="en-US" sz="1800" i="0" u="none" strike="noStrike" dirty="0" err="1">
+              <a:t>InputStream</a:t>
+            </a:r>
+            <a:r>
+              <a:rPr lang="en-US" sz="1800" i="0" u="none" strike="noStrike" dirty="0">
                 <a:solidFill>
-                  <a:srgbClr val="4285F4"/>
+                  <a:schemeClr val="accent5">
+                    <a:lumMod val="75000"/>
+                  </a:schemeClr>
                 </a:solidFill>
                 <a:effectLst/>
                 <a:latin typeface="Arial" panose="020B0604020202020204" pitchFamily="34" charset="0"/>
+                <a:cs typeface="Arial" panose="020B0604020202020204" pitchFamily="34" charset="0"/>
               </a:rPr>
-              <a:t>getSystemResourceAsStream</a:t>
-            </a:r>
-            <a:r>
-              <a:rPr lang="en-US" sz="1800" i="0" u="none" strike="noStrike" dirty="0">
+              <a:t> in = </a:t>
+            </a:r>
+            <a:r>
+              <a:rPr lang="en-US" sz="1800" i="0" u="none" strike="noStrike" dirty="0" err="1">
                 <a:solidFill>
-                  <a:srgbClr val="4285F4"/>
+                  <a:schemeClr val="accent5">
+                    <a:lumMod val="75000"/>
+                  </a:schemeClr>
                 </a:solidFill>
                 <a:effectLst/>
                 <a:latin typeface="Arial" panose="020B0604020202020204" pitchFamily="34" charset="0"/>
+                <a:cs typeface="Arial" panose="020B0604020202020204" pitchFamily="34" charset="0"/>
               </a:rPr>
-              <a:t>(</a:t>
-            </a:r>
-            <a:r>
-              <a:rPr lang="en-US" sz="1800" i="0" u="none" strike="noStrike" dirty="0" err="1">
+              <a:t>getSystemResourceAsStream</a:t>
+            </a:r>
+            <a:r>
+              <a:rPr lang="en-US" sz="1800" i="0" u="none" strike="noStrike" dirty="0">
                 <a:solidFill>
-                  <a:srgbClr val="4285F4"/>
+                  <a:schemeClr val="accent5">
+                    <a:lumMod val="75000"/>
+                  </a:schemeClr>
                 </a:solidFill>
                 <a:effectLst/>
                 <a:latin typeface="Arial" panose="020B0604020202020204" pitchFamily="34" charset="0"/>
+                <a:cs typeface="Arial" panose="020B0604020202020204" pitchFamily="34" charset="0"/>
               </a:rPr>
-              <a:t>name.replace</a:t>
-            </a:r>
-            <a:r>
-              <a:rPr lang="en-US" sz="1800" i="0" u="none" strike="noStrike" dirty="0">
+              <a:t>(</a:t>
+            </a:r>
+            <a:r>
+              <a:rPr lang="en-US" sz="1800" i="0" u="none" strike="noStrike" dirty="0" err="1">
                 <a:solidFill>
-                  <a:srgbClr val="4285F4"/>
+                  <a:schemeClr val="accent5">
+                    <a:lumMod val="75000"/>
+                  </a:schemeClr>
                 </a:solidFill>
                 <a:effectLst/>
                 <a:latin typeface="Arial" panose="020B0604020202020204" pitchFamily="34" charset="0"/>
+                <a:cs typeface="Arial" panose="020B0604020202020204" pitchFamily="34" charset="0"/>
               </a:rPr>
-              <a:t>('.', </a:t>
-            </a:r>
-            <a:r>
-              <a:rPr lang="en-US" sz="1800" i="0" u="none" strike="noStrike" dirty="0" err="1">
+              <a:t>name.replace</a:t>
+            </a:r>
+            <a:r>
+              <a:rPr lang="en-US" sz="1800" i="0" u="none" strike="noStrike" dirty="0">
                 <a:solidFill>
-                  <a:srgbClr val="4285F4"/>
+                  <a:schemeClr val="accent5">
+                    <a:lumMod val="75000"/>
+                  </a:schemeClr>
                 </a:solidFill>
                 <a:effectLst/>
                 <a:latin typeface="Arial" panose="020B0604020202020204" pitchFamily="34" charset="0"/>
+                <a:cs typeface="Arial" panose="020B0604020202020204" pitchFamily="34" charset="0"/>
               </a:rPr>
-              <a:t>File.separatorChar</a:t>
-            </a:r>
-            <a:r>
-              <a:rPr lang="en-US" sz="1800" i="0" u="none" strike="noStrike" dirty="0">
+              <a:t>('.', </a:t>
+            </a:r>
+            <a:r>
+              <a:rPr lang="en-US" sz="1800" i="0" u="none" strike="noStrike" dirty="0" err="1">
                 <a:solidFill>
-                  <a:srgbClr val="4285F4"/>
+                  <a:schemeClr val="accent5">
+                    <a:lumMod val="75000"/>
+                  </a:schemeClr>
                 </a:solidFill>
                 <a:effectLst/>
                 <a:latin typeface="Arial" panose="020B0604020202020204" pitchFamily="34" charset="0"/>
+                <a:cs typeface="Arial" panose="020B0604020202020204" pitchFamily="34" charset="0"/>
+              </a:rPr>
+              <a:t>File.separatorChar</a:t>
+            </a:r>
+            <a:r>
+              <a:rPr lang="en-US" sz="1800" i="0" u="none" strike="noStrike" dirty="0">
+                <a:solidFill>
+                  <a:schemeClr val="accent5">
+                    <a:lumMod val="75000"/>
+                  </a:schemeClr>
+                </a:solidFill>
+                <a:effectLst/>
+                <a:latin typeface="Arial" panose="020B0604020202020204" pitchFamily="34" charset="0"/>
+                <a:cs typeface="Arial" panose="020B0604020202020204" pitchFamily="34" charset="0"/>
               </a:rPr>
               <a:t>) + ".class");</a:t>
             </a:r>
             <a:endParaRPr lang="en-US" dirty="0">
-              <a:effectLst/>
+              <a:solidFill>
+                <a:schemeClr val="accent5">
+                  <a:lumMod val="75000"/>
+                </a:schemeClr>
+              </a:solidFill>
+              <a:latin typeface="Arial" panose="020B0604020202020204" pitchFamily="34" charset="0"/>
+              <a:cs typeface="Arial" panose="020B0604020202020204" pitchFamily="34" charset="0"/>
             </a:endParaRPr>
           </a:p>
           <a:p>
@@ -35535,57 +35733,130 @@
               <a:buNone/>
             </a:pPr>
             <a:r>
-              <a:rPr lang="en-US" sz="1800" i="0" u="none" strike="noStrike" dirty="0">
+              <a:rPr lang="zh-CN" altLang="en-US" sz="1800" dirty="0">
                 <a:solidFill>
-                  <a:srgbClr val="4285F4"/>
+                  <a:schemeClr val="accent5">
+                    <a:lumMod val="75000"/>
+                  </a:schemeClr>
+                </a:solidFill>
+                <a:latin typeface="Arial" panose="020B0604020202020204" pitchFamily="34" charset="0"/>
+                <a:cs typeface="Arial" panose="020B0604020202020204" pitchFamily="34" charset="0"/>
+              </a:rPr>
+              <a:t> </a:t>
+            </a:r>
+            <a:r>
+              <a:rPr lang="zh-CN" altLang="en-US" sz="1800" i="0" u="none" strike="noStrike" dirty="0">
+                <a:solidFill>
+                  <a:schemeClr val="accent5">
+                    <a:lumMod val="75000"/>
+                  </a:schemeClr>
                 </a:solidFill>
                 <a:effectLst/>
                 <a:latin typeface="Arial" panose="020B0604020202020204" pitchFamily="34" charset="0"/>
+                <a:cs typeface="Arial" panose="020B0604020202020204" pitchFamily="34" charset="0"/>
               </a:rPr>
-              <a:t>            byte[] </a:t>
-            </a:r>
-            <a:r>
-              <a:rPr lang="en-US" sz="1800" i="0" u="none" strike="noStrike" dirty="0" err="1">
+              <a:t>  </a:t>
+            </a:r>
+            <a:r>
+              <a:rPr lang="en-US" sz="1800" i="0" u="none" strike="noStrike" dirty="0">
                 <a:solidFill>
-                  <a:srgbClr val="4285F4"/>
+                  <a:schemeClr val="accent5">
+                    <a:lumMod val="75000"/>
+                  </a:schemeClr>
                 </a:solidFill>
                 <a:effectLst/>
                 <a:latin typeface="Arial" panose="020B0604020202020204" pitchFamily="34" charset="0"/>
+                <a:cs typeface="Arial" panose="020B0604020202020204" pitchFamily="34" charset="0"/>
               </a:rPr>
-              <a:t>buf</a:t>
-            </a:r>
-            <a:r>
-              <a:rPr lang="en-US" sz="1800" i="0" u="none" strike="noStrike" dirty="0">
+              <a:t>        </a:t>
+            </a:r>
+            <a:r>
+              <a:rPr lang="zh-CN" altLang="en-US" sz="1800" i="0" u="none" strike="noStrike" dirty="0">
                 <a:solidFill>
-                  <a:srgbClr val="4285F4"/>
+                  <a:schemeClr val="accent5">
+                    <a:lumMod val="75000"/>
+                  </a:schemeClr>
                 </a:solidFill>
                 <a:effectLst/>
                 <a:latin typeface="Arial" panose="020B0604020202020204" pitchFamily="34" charset="0"/>
+                <a:cs typeface="Arial" panose="020B0604020202020204" pitchFamily="34" charset="0"/>
               </a:rPr>
-              <a:t> = in .</a:t>
-            </a:r>
-            <a:r>
-              <a:rPr lang="en-US" sz="1800" i="0" u="none" strike="noStrike" dirty="0" err="1">
+              <a:t> </a:t>
+            </a:r>
+            <a:r>
+              <a:rPr lang="en-US" sz="1800" i="0" u="none" strike="noStrike" dirty="0">
                 <a:solidFill>
-                  <a:srgbClr val="4285F4"/>
+                  <a:schemeClr val="accent5">
+                    <a:lumMod val="75000"/>
+                  </a:schemeClr>
                 </a:solidFill>
                 <a:effectLst/>
                 <a:latin typeface="Arial" panose="020B0604020202020204" pitchFamily="34" charset="0"/>
+                <a:cs typeface="Arial" panose="020B0604020202020204" pitchFamily="34" charset="0"/>
               </a:rPr>
-              <a:t>readAllBytes</a:t>
-            </a:r>
-            <a:r>
-              <a:rPr lang="en-US" sz="1800" i="0" u="none" strike="noStrike" dirty="0">
+              <a:t>byte[] </a:t>
+            </a:r>
+            <a:r>
+              <a:rPr lang="en-US" sz="1800" i="0" u="none" strike="noStrike" dirty="0" err="1">
                 <a:solidFill>
-                  <a:srgbClr val="4285F4"/>
+                  <a:schemeClr val="accent5">
+                    <a:lumMod val="75000"/>
+                  </a:schemeClr>
                 </a:solidFill>
                 <a:effectLst/>
                 <a:latin typeface="Arial" panose="020B0604020202020204" pitchFamily="34" charset="0"/>
+                <a:cs typeface="Arial" panose="020B0604020202020204" pitchFamily="34" charset="0"/>
+              </a:rPr>
+              <a:t>buf</a:t>
+            </a:r>
+            <a:r>
+              <a:rPr lang="en-US" sz="1800" i="0" u="none" strike="noStrike" dirty="0">
+                <a:solidFill>
+                  <a:schemeClr val="accent5">
+                    <a:lumMod val="75000"/>
+                  </a:schemeClr>
+                </a:solidFill>
+                <a:effectLst/>
+                <a:latin typeface="Arial" panose="020B0604020202020204" pitchFamily="34" charset="0"/>
+                <a:cs typeface="Arial" panose="020B0604020202020204" pitchFamily="34" charset="0"/>
+              </a:rPr>
+              <a:t> = in .</a:t>
+            </a:r>
+            <a:r>
+              <a:rPr lang="en-US" sz="1800" i="0" u="none" strike="noStrike" dirty="0" err="1">
+                <a:solidFill>
+                  <a:schemeClr val="accent5">
+                    <a:lumMod val="75000"/>
+                  </a:schemeClr>
+                </a:solidFill>
+                <a:effectLst/>
+                <a:latin typeface="Arial" panose="020B0604020202020204" pitchFamily="34" charset="0"/>
+                <a:cs typeface="Arial" panose="020B0604020202020204" pitchFamily="34" charset="0"/>
+              </a:rPr>
+              <a:t>readAllBytes</a:t>
+            </a:r>
+            <a:r>
+              <a:rPr lang="en-US" sz="1800" i="0" u="none" strike="noStrike" dirty="0">
+                <a:solidFill>
+                  <a:schemeClr val="accent5">
+                    <a:lumMod val="75000"/>
+                  </a:schemeClr>
+                </a:solidFill>
+                <a:effectLst/>
+                <a:latin typeface="Arial" panose="020B0604020202020204" pitchFamily="34" charset="0"/>
+                <a:cs typeface="Arial" panose="020B0604020202020204" pitchFamily="34" charset="0"/>
               </a:rPr>
               <a:t>();</a:t>
             </a:r>
             <a:endParaRPr lang="en-US" dirty="0">
+              <a:solidFill>
+                <a:schemeClr val="accent5">
+                  <a:lumMod val="75000"/>
+                </a:schemeClr>
+              </a:solidFill>
               <a:effectLst/>
+              <a:latin typeface="Arial" panose="020B0604020202020204" pitchFamily="34" charset="0"/>
+              <a:cs typeface="Arial" panose="020B0604020202020204" pitchFamily="34" charset="0"/>
             </a:endParaRPr>
           </a:p>
           <a:p>
@@ -35599,77 +35870,144 @@
               <a:buNone/>
             </a:pPr>
             <a:r>
-              <a:rPr lang="en-US" sz="1800" i="0" u="none" strike="noStrike" dirty="0">
+              <a:rPr lang="zh-CN" altLang="en-US" sz="1800" i="0" u="none" strike="noStrike" dirty="0">
                 <a:solidFill>
-                  <a:srgbClr val="4285F4"/>
+                  <a:schemeClr val="accent5">
+                    <a:lumMod val="75000"/>
+                  </a:schemeClr>
                 </a:solidFill>
                 <a:effectLst/>
                 <a:latin typeface="Arial" panose="020B0604020202020204" pitchFamily="34" charset="0"/>
+                <a:cs typeface="Arial" panose="020B0604020202020204" pitchFamily="34" charset="0"/>
               </a:rPr>
-              <a:t>            return </a:t>
-            </a:r>
-            <a:r>
-              <a:rPr lang="en-US" sz="1800" i="0" u="none" strike="noStrike" dirty="0" err="1">
+              <a:t>  </a:t>
+            </a:r>
+            <a:r>
+              <a:rPr lang="en-US" sz="1800" i="0" u="none" strike="noStrike" dirty="0">
                 <a:solidFill>
-                  <a:srgbClr val="4285F4"/>
+                  <a:schemeClr val="accent5">
+                    <a:lumMod val="75000"/>
+                  </a:schemeClr>
                 </a:solidFill>
                 <a:effectLst/>
                 <a:latin typeface="Arial" panose="020B0604020202020204" pitchFamily="34" charset="0"/>
+                <a:cs typeface="Arial" panose="020B0604020202020204" pitchFamily="34" charset="0"/>
               </a:rPr>
-              <a:t>defineClass</a:t>
-            </a:r>
-            <a:r>
-              <a:rPr lang="en-US" sz="1800" i="0" u="none" strike="noStrike" dirty="0">
+              <a:t>         </a:t>
+            </a:r>
+            <a:r>
+              <a:rPr lang="zh-CN" altLang="en-US" sz="1800" i="0" u="none" strike="noStrike" dirty="0">
                 <a:solidFill>
-                  <a:srgbClr val="4285F4"/>
+                  <a:schemeClr val="accent5">
+                    <a:lumMod val="75000"/>
+                  </a:schemeClr>
                 </a:solidFill>
                 <a:effectLst/>
                 <a:latin typeface="Arial" panose="020B0604020202020204" pitchFamily="34" charset="0"/>
+                <a:cs typeface="Arial" panose="020B0604020202020204" pitchFamily="34" charset="0"/>
               </a:rPr>
-              <a:t>(name, </a:t>
-            </a:r>
-            <a:r>
-              <a:rPr lang="en-US" sz="1800" i="0" u="none" strike="noStrike" dirty="0" err="1">
+              <a:t> </a:t>
+            </a:r>
+            <a:r>
+              <a:rPr lang="en-US" sz="1800" i="0" u="none" strike="noStrike" dirty="0">
                 <a:solidFill>
-                  <a:srgbClr val="4285F4"/>
+                  <a:schemeClr val="accent5">
+                    <a:lumMod val="75000"/>
+                  </a:schemeClr>
                 </a:solidFill>
                 <a:effectLst/>
                 <a:latin typeface="Arial" panose="020B0604020202020204" pitchFamily="34" charset="0"/>
+                <a:cs typeface="Arial" panose="020B0604020202020204" pitchFamily="34" charset="0"/>
               </a:rPr>
-              <a:t>buf</a:t>
-            </a:r>
-            <a:r>
-              <a:rPr lang="en-US" sz="1800" i="0" u="none" strike="noStrike" dirty="0">
+              <a:t>return </a:t>
+            </a:r>
+            <a:r>
+              <a:rPr lang="en-US" sz="1800" i="0" u="none" strike="noStrike" dirty="0" err="1">
                 <a:solidFill>
-                  <a:srgbClr val="4285F4"/>
+                  <a:schemeClr val="accent5">
+                    <a:lumMod val="75000"/>
+                  </a:schemeClr>
                 </a:solidFill>
                 <a:effectLst/>
                 <a:latin typeface="Arial" panose="020B0604020202020204" pitchFamily="34" charset="0"/>
+                <a:cs typeface="Arial" panose="020B0604020202020204" pitchFamily="34" charset="0"/>
               </a:rPr>
-              <a:t>, 0, </a:t>
-            </a:r>
-            <a:r>
-              <a:rPr lang="en-US" sz="1800" i="0" u="none" strike="noStrike" dirty="0" err="1">
+              <a:t>defineClass</a:t>
+            </a:r>
+            <a:r>
+              <a:rPr lang="en-US" sz="1800" i="0" u="none" strike="noStrike" dirty="0">
                 <a:solidFill>
-                  <a:srgbClr val="4285F4"/>
+                  <a:schemeClr val="accent5">
+                    <a:lumMod val="75000"/>
+                  </a:schemeClr>
                 </a:solidFill>
                 <a:effectLst/>
                 <a:latin typeface="Arial" panose="020B0604020202020204" pitchFamily="34" charset="0"/>
+                <a:cs typeface="Arial" panose="020B0604020202020204" pitchFamily="34" charset="0"/>
               </a:rPr>
-              <a:t>buf.length</a:t>
-            </a:r>
-            <a:r>
-              <a:rPr lang="en-US" sz="1800" i="0" u="none" strike="noStrike" dirty="0">
+              <a:t>(name, </a:t>
+            </a:r>
+            <a:r>
+              <a:rPr lang="en-US" sz="1800" i="0" u="none" strike="noStrike" dirty="0" err="1">
                 <a:solidFill>
-                  <a:srgbClr val="4285F4"/>
+                  <a:schemeClr val="accent5">
+                    <a:lumMod val="75000"/>
+                  </a:schemeClr>
                 </a:solidFill>
                 <a:effectLst/>
                 <a:latin typeface="Arial" panose="020B0604020202020204" pitchFamily="34" charset="0"/>
+                <a:cs typeface="Arial" panose="020B0604020202020204" pitchFamily="34" charset="0"/>
+              </a:rPr>
+              <a:t>buf</a:t>
+            </a:r>
+            <a:r>
+              <a:rPr lang="en-US" sz="1800" i="0" u="none" strike="noStrike" dirty="0">
+                <a:solidFill>
+                  <a:schemeClr val="accent5">
+                    <a:lumMod val="75000"/>
+                  </a:schemeClr>
+                </a:solidFill>
+                <a:effectLst/>
+                <a:latin typeface="Arial" panose="020B0604020202020204" pitchFamily="34" charset="0"/>
+                <a:cs typeface="Arial" panose="020B0604020202020204" pitchFamily="34" charset="0"/>
+              </a:rPr>
+              <a:t>, 0, </a:t>
+            </a:r>
+            <a:r>
+              <a:rPr lang="en-US" sz="1800" i="0" u="none" strike="noStrike" dirty="0" err="1">
+                <a:solidFill>
+                  <a:schemeClr val="accent5">
+                    <a:lumMod val="75000"/>
+                  </a:schemeClr>
+                </a:solidFill>
+                <a:effectLst/>
+                <a:latin typeface="Arial" panose="020B0604020202020204" pitchFamily="34" charset="0"/>
+                <a:cs typeface="Arial" panose="020B0604020202020204" pitchFamily="34" charset="0"/>
+              </a:rPr>
+              <a:t>buf.length</a:t>
+            </a:r>
+            <a:r>
+              <a:rPr lang="en-US" sz="1800" i="0" u="none" strike="noStrike" dirty="0">
+                <a:solidFill>
+                  <a:schemeClr val="accent5">
+                    <a:lumMod val="75000"/>
+                  </a:schemeClr>
+                </a:solidFill>
+                <a:effectLst/>
+                <a:latin typeface="Arial" panose="020B0604020202020204" pitchFamily="34" charset="0"/>
+                <a:cs typeface="Arial" panose="020B0604020202020204" pitchFamily="34" charset="0"/>
               </a:rPr>
               <a:t>);</a:t>
             </a:r>
             <a:endParaRPr lang="en-US" dirty="0">
+              <a:solidFill>
+                <a:schemeClr val="accent5">
+                  <a:lumMod val="75000"/>
+                </a:schemeClr>
+              </a:solidFill>
               <a:effectLst/>
+              <a:latin typeface="Arial" panose="020B0604020202020204" pitchFamily="34" charset="0"/>
+              <a:cs typeface="Arial" panose="020B0604020202020204" pitchFamily="34" charset="0"/>
             </a:endParaRPr>
           </a:p>
           <a:p>
@@ -35683,37 +36021,80 @@
               <a:buNone/>
             </a:pPr>
             <a:r>
-              <a:rPr lang="en-US" sz="1800" i="0" u="none" strike="noStrike" dirty="0">
+              <a:rPr lang="zh-CN" altLang="en-US" sz="1800" i="0" u="none" strike="noStrike" dirty="0">
+                <a:effectLst/>
+                <a:latin typeface="Arial" panose="020B0604020202020204" pitchFamily="34" charset="0"/>
+                <a:cs typeface="Arial" panose="020B0604020202020204" pitchFamily="34" charset="0"/>
+              </a:rPr>
+              <a:t> </a:t>
+            </a:r>
+            <a:r>
+              <a:rPr lang="zh-CN" altLang="en-US" sz="1800" i="0" u="none" strike="noStrike" dirty="0">
                 <a:solidFill>
-                  <a:srgbClr val="595959"/>
+                  <a:schemeClr val="accent2">
+                    <a:lumMod val="75000"/>
+                  </a:schemeClr>
                 </a:solidFill>
                 <a:effectLst/>
                 <a:latin typeface="Arial" panose="020B0604020202020204" pitchFamily="34" charset="0"/>
+                <a:cs typeface="Arial" panose="020B0604020202020204" pitchFamily="34" charset="0"/>
               </a:rPr>
-              <a:t>        } catch (</a:t>
-            </a:r>
-            <a:r>
-              <a:rPr lang="en-US" sz="1800" i="0" u="none" strike="noStrike" dirty="0" err="1">
+              <a:t> </a:t>
+            </a:r>
+            <a:r>
+              <a:rPr lang="en-US" sz="1800" i="0" u="none" strike="noStrike" dirty="0">
                 <a:solidFill>
-                  <a:srgbClr val="595959"/>
+                  <a:schemeClr val="accent2">
+                    <a:lumMod val="75000"/>
+                  </a:schemeClr>
                 </a:solidFill>
                 <a:effectLst/>
                 <a:latin typeface="Arial" panose="020B0604020202020204" pitchFamily="34" charset="0"/>
+                <a:cs typeface="Arial" panose="020B0604020202020204" pitchFamily="34" charset="0"/>
               </a:rPr>
-              <a:t>IOException</a:t>
-            </a:r>
-            <a:r>
-              <a:rPr lang="en-US" sz="1800" i="0" u="none" strike="noStrike" dirty="0">
+              <a:t>     </a:t>
+            </a:r>
+            <a:r>
+              <a:rPr lang="zh-CN" altLang="en-US" sz="1800" i="0" u="none" strike="noStrike" dirty="0">
                 <a:solidFill>
-                  <a:srgbClr val="595959"/>
+                  <a:schemeClr val="accent2">
+                    <a:lumMod val="75000"/>
+                  </a:schemeClr>
                 </a:solidFill>
                 <a:effectLst/>
                 <a:latin typeface="Arial" panose="020B0604020202020204" pitchFamily="34" charset="0"/>
+                <a:cs typeface="Arial" panose="020B0604020202020204" pitchFamily="34" charset="0"/>
+              </a:rPr>
+              <a:t> </a:t>
+            </a:r>
+            <a:r>
+              <a:rPr lang="en-US" sz="1800" i="0" u="none" strike="noStrike" dirty="0">
+                <a:effectLst/>
+                <a:latin typeface="Arial" panose="020B0604020202020204" pitchFamily="34" charset="0"/>
+                <a:cs typeface="Arial" panose="020B0604020202020204" pitchFamily="34" charset="0"/>
+              </a:rPr>
+              <a:t>} catch (</a:t>
+            </a:r>
+            <a:r>
+              <a:rPr lang="en-US" sz="1800" i="0" u="none" strike="noStrike" dirty="0" err="1">
+                <a:effectLst/>
+                <a:latin typeface="Arial" panose="020B0604020202020204" pitchFamily="34" charset="0"/>
+                <a:cs typeface="Arial" panose="020B0604020202020204" pitchFamily="34" charset="0"/>
+              </a:rPr>
+              <a:t>IOException</a:t>
+            </a:r>
+            <a:r>
+              <a:rPr lang="en-US" sz="1800" i="0" u="none" strike="noStrike" dirty="0">
+                <a:effectLst/>
+                <a:latin typeface="Arial" panose="020B0604020202020204" pitchFamily="34" charset="0"/>
+                <a:cs typeface="Arial" panose="020B0604020202020204" pitchFamily="34" charset="0"/>
               </a:rPr>
               <a:t> e) {</a:t>
             </a:r>
             <a:endParaRPr lang="en-US" dirty="0">
               <a:effectLst/>
+              <a:latin typeface="Arial" panose="020B0604020202020204" pitchFamily="34" charset="0"/>
+              <a:cs typeface="Arial" panose="020B0604020202020204" pitchFamily="34" charset="0"/>
             </a:endParaRPr>
           </a:p>
           <a:p>
@@ -35727,37 +36108,57 @@
               <a:buNone/>
             </a:pPr>
             <a:r>
-              <a:rPr lang="en-US" sz="1800" i="0" u="none" strike="noStrike" dirty="0">
-                <a:solidFill>
-                  <a:srgbClr val="595959"/>
-                </a:solidFill>
+              <a:rPr lang="zh-CN" altLang="en-US" sz="1800" i="0" u="none" strike="noStrike" dirty="0">
                 <a:effectLst/>
                 <a:latin typeface="Arial" panose="020B0604020202020204" pitchFamily="34" charset="0"/>
+                <a:cs typeface="Arial" panose="020B0604020202020204" pitchFamily="34" charset="0"/>
               </a:rPr>
-              <a:t>            throw new </a:t>
-            </a:r>
-            <a:r>
-              <a:rPr lang="en-US" sz="1800" i="0" u="none" strike="noStrike" dirty="0" err="1">
-                <a:solidFill>
-                  <a:srgbClr val="595959"/>
-                </a:solidFill>
+              <a:t>  </a:t>
+            </a:r>
+            <a:r>
+              <a:rPr lang="en-US" sz="1800" i="0" u="none" strike="noStrike" dirty="0">
                 <a:effectLst/>
                 <a:latin typeface="Arial" panose="020B0604020202020204" pitchFamily="34" charset="0"/>
+                <a:cs typeface="Arial" panose="020B0604020202020204" pitchFamily="34" charset="0"/>
+              </a:rPr>
+              <a:t>         </a:t>
+            </a:r>
+            <a:r>
+              <a:rPr lang="zh-CN" altLang="en-US" sz="1800" i="0" u="none" strike="noStrike" dirty="0">
+                <a:effectLst/>
+                <a:latin typeface="Arial" panose="020B0604020202020204" pitchFamily="34" charset="0"/>
+                <a:cs typeface="Arial" panose="020B0604020202020204" pitchFamily="34" charset="0"/>
+              </a:rPr>
+              <a:t> </a:t>
+            </a:r>
+            <a:r>
+              <a:rPr lang="en-US" sz="1800" i="0" u="none" strike="noStrike" dirty="0">
+                <a:effectLst/>
+                <a:latin typeface="Arial" panose="020B0604020202020204" pitchFamily="34" charset="0"/>
+                <a:cs typeface="Arial" panose="020B0604020202020204" pitchFamily="34" charset="0"/>
+              </a:rPr>
+              <a:t>throw new </a:t>
+            </a:r>
+            <a:r>
+              <a:rPr lang="en-US" sz="1800" i="0" u="none" strike="noStrike" dirty="0" err="1">
+                <a:effectLst/>
+                <a:latin typeface="Arial" panose="020B0604020202020204" pitchFamily="34" charset="0"/>
+                <a:cs typeface="Arial" panose="020B0604020202020204" pitchFamily="34" charset="0"/>
               </a:rPr>
               <a:t>ClassNotFoundException</a:t>
             </a:r>
             <a:r>
               <a:rPr lang="en-US" sz="1800" i="0" u="none" strike="noStrike" dirty="0">
-                <a:solidFill>
-                  <a:srgbClr val="595959"/>
-                </a:solidFill>
                 <a:effectLst/>
                 <a:latin typeface="Arial" panose="020B0604020202020204" pitchFamily="34" charset="0"/>
+                <a:cs typeface="Arial" panose="020B0604020202020204" pitchFamily="34" charset="0"/>
               </a:rPr>
               <a:t>(name);</a:t>
             </a:r>
             <a:endParaRPr lang="en-US" dirty="0">
               <a:effectLst/>
+              <a:latin typeface="Arial" panose="020B0604020202020204" pitchFamily="34" charset="0"/>
+              <a:cs typeface="Arial" panose="020B0604020202020204" pitchFamily="34" charset="0"/>
             </a:endParaRPr>
           </a:p>
           <a:p>
@@ -35771,17 +36172,41 @@
               <a:buNone/>
             </a:pPr>
             <a:r>
-              <a:rPr lang="en-US" sz="1800" i="0" u="none" strike="noStrike" dirty="0">
-                <a:solidFill>
-                  <a:srgbClr val="595959"/>
-                </a:solidFill>
+              <a:rPr lang="zh-CN" altLang="en-US" sz="1800" i="0" u="none" strike="noStrike" dirty="0">
                 <a:effectLst/>
                 <a:latin typeface="Arial" panose="020B0604020202020204" pitchFamily="34" charset="0"/>
+                <a:cs typeface="Arial" panose="020B0604020202020204" pitchFamily="34" charset="0"/>
               </a:rPr>
-              <a:t>        }</a:t>
+              <a:t>  </a:t>
+            </a:r>
+            <a:r>
+              <a:rPr lang="en-US" sz="1800" i="0" u="none" strike="noStrike" dirty="0">
+                <a:effectLst/>
+                <a:latin typeface="Arial" panose="020B0604020202020204" pitchFamily="34" charset="0"/>
+                <a:cs typeface="Arial" panose="020B0604020202020204" pitchFamily="34" charset="0"/>
+              </a:rPr>
+              <a:t>     </a:t>
+            </a:r>
+            <a:r>
+              <a:rPr lang="zh-CN" altLang="en-US" sz="1800" i="0" u="none" strike="noStrike" dirty="0">
+                <a:effectLst/>
+                <a:latin typeface="Arial" panose="020B0604020202020204" pitchFamily="34" charset="0"/>
+                <a:cs typeface="Arial" panose="020B0604020202020204" pitchFamily="34" charset="0"/>
+              </a:rPr>
+              <a:t> </a:t>
+            </a:r>
+            <a:r>
+              <a:rPr lang="en-US" sz="1800" i="0" u="none" strike="noStrike" dirty="0">
+                <a:effectLst/>
+                <a:latin typeface="Arial" panose="020B0604020202020204" pitchFamily="34" charset="0"/>
+                <a:cs typeface="Arial" panose="020B0604020202020204" pitchFamily="34" charset="0"/>
+              </a:rPr>
+              <a:t>}</a:t>
             </a:r>
             <a:endParaRPr lang="en-US" dirty="0">
               <a:effectLst/>
+              <a:latin typeface="Arial" panose="020B0604020202020204" pitchFamily="34" charset="0"/>
+              <a:cs typeface="Arial" panose="020B0604020202020204" pitchFamily="34" charset="0"/>
             </a:endParaRPr>
           </a:p>
           <a:p>
@@ -35795,17 +36220,74 @@
               <a:buNone/>
             </a:pPr>
             <a:r>
-              <a:rPr lang="en-US" sz="1800" i="0" u="none" strike="noStrike" dirty="0">
+              <a:rPr lang="zh-CN" altLang="en-US" sz="1800" i="0" u="none" strike="noStrike" dirty="0">
+                <a:effectLst/>
+                <a:latin typeface="Arial" panose="020B0604020202020204" pitchFamily="34" charset="0"/>
+                <a:cs typeface="Arial" panose="020B0604020202020204" pitchFamily="34" charset="0"/>
+              </a:rPr>
+              <a:t> </a:t>
+            </a:r>
+            <a:r>
+              <a:rPr lang="zh-CN" altLang="en-US" sz="1800" i="0" u="none" strike="noStrike" dirty="0">
                 <a:solidFill>
-                  <a:srgbClr val="4285F4"/>
+                  <a:schemeClr val="accent2">
+                    <a:lumMod val="75000"/>
+                  </a:schemeClr>
                 </a:solidFill>
                 <a:effectLst/>
                 <a:latin typeface="Arial" panose="020B0604020202020204" pitchFamily="34" charset="0"/>
+                <a:cs typeface="Arial" panose="020B0604020202020204" pitchFamily="34" charset="0"/>
               </a:rPr>
-              <a:t>    }</a:t>
+              <a:t> </a:t>
+            </a:r>
+            <a:r>
+              <a:rPr lang="en-US" sz="1800" i="0" u="none" strike="noStrike" dirty="0">
+                <a:solidFill>
+                  <a:schemeClr val="accent2">
+                    <a:lumMod val="75000"/>
+                  </a:schemeClr>
+                </a:solidFill>
+                <a:effectLst/>
+                <a:latin typeface="Arial" panose="020B0604020202020204" pitchFamily="34" charset="0"/>
+                <a:cs typeface="Arial" panose="020B0604020202020204" pitchFamily="34" charset="0"/>
+              </a:rPr>
+              <a:t> </a:t>
+            </a:r>
+            <a:r>
+              <a:rPr lang="zh-CN" altLang="en-US" sz="1800" i="0" u="none" strike="noStrike" dirty="0">
+                <a:solidFill>
+                  <a:schemeClr val="accent2">
+                    <a:lumMod val="75000"/>
+                  </a:schemeClr>
+                </a:solidFill>
+                <a:effectLst/>
+                <a:latin typeface="Arial" panose="020B0604020202020204" pitchFamily="34" charset="0"/>
+                <a:cs typeface="Arial" panose="020B0604020202020204" pitchFamily="34" charset="0"/>
+              </a:rPr>
+              <a:t> </a:t>
+            </a:r>
+            <a:r>
+              <a:rPr lang="en-US" sz="1800" i="0" u="none" strike="noStrike" dirty="0">
+                <a:solidFill>
+                  <a:schemeClr val="accent5">
+                    <a:lumMod val="75000"/>
+                  </a:schemeClr>
+                </a:solidFill>
+                <a:effectLst/>
+                <a:latin typeface="Arial" panose="020B0604020202020204" pitchFamily="34" charset="0"/>
+                <a:cs typeface="Arial" panose="020B0604020202020204" pitchFamily="34" charset="0"/>
+              </a:rPr>
+              <a:t>}</a:t>
             </a:r>
             <a:endParaRPr lang="en-US" dirty="0">
+              <a:solidFill>
+                <a:schemeClr val="accent5">
+                  <a:lumMod val="75000"/>
+                </a:schemeClr>
+              </a:solidFill>
               <a:effectLst/>
+              <a:latin typeface="Arial" panose="020B0604020202020204" pitchFamily="34" charset="0"/>
+              <a:cs typeface="Arial" panose="020B0604020202020204" pitchFamily="34" charset="0"/>
             </a:endParaRPr>
           </a:p>
           <a:p>
@@ -35819,37 +36301,92 @@
               <a:buNone/>
             </a:pPr>
             <a:r>
-              <a:rPr lang="en-US" sz="1800" i="0" u="none" strike="noStrike" dirty="0">
+              <a:rPr lang="zh-CN" altLang="en-US" sz="1800" i="0" u="none" strike="noStrike" dirty="0">
                 <a:solidFill>
-                  <a:srgbClr val="4285F4"/>
+                  <a:schemeClr val="accent2">
+                    <a:lumMod val="75000"/>
+                  </a:schemeClr>
                 </a:solidFill>
                 <a:effectLst/>
                 <a:latin typeface="Arial" panose="020B0604020202020204" pitchFamily="34" charset="0"/>
+                <a:cs typeface="Arial" panose="020B0604020202020204" pitchFamily="34" charset="0"/>
               </a:rPr>
-              <a:t>    return </a:t>
-            </a:r>
-            <a:r>
-              <a:rPr lang="en-US" sz="1800" i="0" u="none" strike="noStrike" dirty="0" err="1">
+              <a:t>  </a:t>
+            </a:r>
+            <a:r>
+              <a:rPr lang="en-US" sz="1800" i="0" u="none" strike="noStrike" dirty="0">
                 <a:solidFill>
-                  <a:srgbClr val="4285F4"/>
+                  <a:schemeClr val="accent2">
+                    <a:lumMod val="75000"/>
+                  </a:schemeClr>
                 </a:solidFill>
                 <a:effectLst/>
                 <a:latin typeface="Arial" panose="020B0604020202020204" pitchFamily="34" charset="0"/>
+                <a:cs typeface="Arial" panose="020B0604020202020204" pitchFamily="34" charset="0"/>
               </a:rPr>
-              <a:t>super.loadClass</a:t>
-            </a:r>
-            <a:r>
-              <a:rPr lang="en-US" sz="1800" i="0" u="none" strike="noStrike" dirty="0">
+              <a:t> </a:t>
+            </a:r>
+            <a:r>
+              <a:rPr lang="zh-CN" altLang="en-US" sz="1800" i="0" u="none" strike="noStrike" dirty="0">
                 <a:solidFill>
-                  <a:srgbClr val="4285F4"/>
+                  <a:schemeClr val="accent2">
+                    <a:lumMod val="75000"/>
+                  </a:schemeClr>
                 </a:solidFill>
                 <a:effectLst/>
                 <a:latin typeface="Arial" panose="020B0604020202020204" pitchFamily="34" charset="0"/>
+                <a:cs typeface="Arial" panose="020B0604020202020204" pitchFamily="34" charset="0"/>
+              </a:rPr>
+              <a:t> </a:t>
+            </a:r>
+            <a:r>
+              <a:rPr lang="en-US" sz="1800" i="0" u="none" strike="noStrike" dirty="0">
+                <a:solidFill>
+                  <a:schemeClr val="accent5">
+                    <a:lumMod val="75000"/>
+                  </a:schemeClr>
+                </a:solidFill>
+                <a:effectLst/>
+                <a:latin typeface="Arial" panose="020B0604020202020204" pitchFamily="34" charset="0"/>
+                <a:cs typeface="Arial" panose="020B0604020202020204" pitchFamily="34" charset="0"/>
+              </a:rPr>
+              <a:t>return </a:t>
+            </a:r>
+            <a:r>
+              <a:rPr lang="en-US" sz="1800" i="0" u="none" strike="noStrike" dirty="0" err="1">
+                <a:solidFill>
+                  <a:schemeClr val="accent5">
+                    <a:lumMod val="75000"/>
+                  </a:schemeClr>
+                </a:solidFill>
+                <a:effectLst/>
+                <a:latin typeface="Arial" panose="020B0604020202020204" pitchFamily="34" charset="0"/>
+                <a:cs typeface="Arial" panose="020B0604020202020204" pitchFamily="34" charset="0"/>
+              </a:rPr>
+              <a:t>super.loadClass</a:t>
+            </a:r>
+            <a:r>
+              <a:rPr lang="en-US" sz="1800" i="0" u="none" strike="noStrike" dirty="0">
+                <a:solidFill>
+                  <a:schemeClr val="accent5">
+                    <a:lumMod val="75000"/>
+                  </a:schemeClr>
+                </a:solidFill>
+                <a:effectLst/>
+                <a:latin typeface="Arial" panose="020B0604020202020204" pitchFamily="34" charset="0"/>
+                <a:cs typeface="Arial" panose="020B0604020202020204" pitchFamily="34" charset="0"/>
               </a:rPr>
               <a:t>(name, resolve);</a:t>
             </a:r>
             <a:endParaRPr lang="en-US" dirty="0">
+              <a:solidFill>
+                <a:schemeClr val="accent5">
+                  <a:lumMod val="75000"/>
+                </a:schemeClr>
+              </a:solidFill>
               <a:effectLst/>
+              <a:latin typeface="Arial" panose="020B0604020202020204" pitchFamily="34" charset="0"/>
+              <a:cs typeface="Arial" panose="020B0604020202020204" pitchFamily="34" charset="0"/>
             </a:endParaRPr>
           </a:p>
           <a:p>
@@ -35864,15 +36401,16 @@
             </a:pPr>
             <a:r>
               <a:rPr lang="en-US" sz="1800" i="0" u="none" strike="noStrike" dirty="0">
-                <a:solidFill>
-                  <a:srgbClr val="595959"/>
-                </a:solidFill>
                 <a:effectLst/>
                 <a:latin typeface="Arial" panose="020B0604020202020204" pitchFamily="34" charset="0"/>
+                <a:cs typeface="Arial" panose="020B0604020202020204" pitchFamily="34" charset="0"/>
               </a:rPr>
               <a:t>}</a:t>
             </a:r>
-            <a:endParaRPr lang="en-US" dirty="0"/>
+            <a:endParaRPr lang="en-US" dirty="0">
+              <a:latin typeface="Arial" panose="020B0604020202020204" pitchFamily="34" charset="0"/>
+              <a:cs typeface="Arial" panose="020B0604020202020204" pitchFamily="34" charset="0"/>
+            </a:endParaRPr>
           </a:p>
         </p:txBody>
       </p:sp>
@@ -35890,7 +36428,7 @@
         </p:nvSpPr>
         <p:spPr>
           <a:xfrm>
-            <a:off x="5331822" y="780506"/>
+            <a:off x="5105400" y="796426"/>
             <a:ext cx="1136470" cy="191587"/>
           </a:xfrm>
           <a:prstGeom prst="flowChartDisplay">
@@ -35946,7 +36484,7 @@
         </p:nvSpPr>
         <p:spPr>
           <a:xfrm>
-            <a:off x="5331822" y="1101634"/>
+            <a:off x="5105400" y="1116670"/>
             <a:ext cx="1136470" cy="191587"/>
           </a:xfrm>
           <a:prstGeom prst="flowChartDisplay">
@@ -36002,7 +36540,7 @@
         </p:nvSpPr>
         <p:spPr>
           <a:xfrm>
-            <a:off x="2971800" y="1456104"/>
+            <a:off x="2362200" y="1451069"/>
             <a:ext cx="1136470" cy="191587"/>
           </a:xfrm>
           <a:prstGeom prst="flowChartDisplay">
@@ -36034,12 +36572,20 @@
           <a:p>
             <a:pPr algn="ctr"/>
             <a:r>
+              <a:rPr lang="en-US" altLang="zh-CN" sz="1200" dirty="0">
+                <a:solidFill>
+                  <a:schemeClr val="tx1"/>
+                </a:solidFill>
+              </a:rPr>
+              <a:t>–</a:t>
+            </a:r>
+            <a:r>
               <a:rPr lang="en-US" sz="1200" dirty="0">
                 <a:solidFill>
                   <a:schemeClr val="tx1"/>
                 </a:solidFill>
               </a:rPr>
-              <a:t>- 0.008</a:t>
+              <a:t> 0.008</a:t>
             </a:r>
           </a:p>
         </p:txBody>
@@ -36058,7 +36604,7 @@
         </p:nvSpPr>
         <p:spPr>
           <a:xfrm>
-            <a:off x="2971800" y="1805397"/>
+            <a:off x="2362200" y="1779273"/>
             <a:ext cx="1136470" cy="191587"/>
           </a:xfrm>
           <a:prstGeom prst="flowChartDisplay">
@@ -36090,12 +36636,20 @@
           <a:p>
             <a:pPr algn="ctr"/>
             <a:r>
+              <a:rPr lang="en-US" altLang="zh-CN" sz="1200" dirty="0">
+                <a:solidFill>
+                  <a:schemeClr val="tx1"/>
+                </a:solidFill>
+              </a:rPr>
+              <a:t>–</a:t>
+            </a:r>
+            <a:r>
               <a:rPr lang="en-US" sz="1200" dirty="0">
                 <a:solidFill>
                   <a:schemeClr val="tx1"/>
                 </a:solidFill>
               </a:rPr>
-              <a:t>- 0.052</a:t>
+              <a:t> 0.052</a:t>
             </a:r>
           </a:p>
         </p:txBody>
@@ -36114,7 +36668,7 @@
         </p:nvSpPr>
         <p:spPr>
           <a:xfrm>
-            <a:off x="2971800" y="2114006"/>
+            <a:off x="2362200" y="2114006"/>
             <a:ext cx="1136470" cy="191587"/>
           </a:xfrm>
           <a:prstGeom prst="flowChartDisplay">
@@ -36146,12 +36700,20 @@
           <a:p>
             <a:pPr algn="ctr"/>
             <a:r>
+              <a:rPr lang="en-US" altLang="zh-CN" sz="1200" dirty="0">
+                <a:solidFill>
+                  <a:schemeClr val="tx1"/>
+                </a:solidFill>
+              </a:rPr>
+              <a:t>–</a:t>
+            </a:r>
+            <a:r>
               <a:rPr lang="en-US" sz="1200" dirty="0">
                 <a:solidFill>
                   <a:schemeClr val="tx1"/>
                 </a:solidFill>
               </a:rPr>
-              <a:t>- 0.022</a:t>
+              <a:t> 0.022</a:t>
             </a:r>
           </a:p>
         </p:txBody>
@@ -36170,7 +36732,7 @@
         </p:nvSpPr>
         <p:spPr>
           <a:xfrm>
-            <a:off x="2971800" y="2761706"/>
+            <a:off x="2743200" y="2770415"/>
             <a:ext cx="1136470" cy="191587"/>
           </a:xfrm>
           <a:prstGeom prst="flowChartDisplay">
@@ -36226,7 +36788,7 @@
         </p:nvSpPr>
         <p:spPr>
           <a:xfrm>
-            <a:off x="10785565" y="3098280"/>
+            <a:off x="10591800" y="3109166"/>
             <a:ext cx="1136470" cy="191587"/>
           </a:xfrm>
           <a:prstGeom prst="flowChartDisplay">
@@ -36285,7 +36847,7 @@
         </p:nvSpPr>
         <p:spPr>
           <a:xfrm>
-            <a:off x="5791200" y="3799320"/>
+            <a:off x="5562600" y="3790611"/>
             <a:ext cx="1136470" cy="191587"/>
           </a:xfrm>
           <a:prstGeom prst="flowChartDisplay">
@@ -36341,7 +36903,7 @@
         </p:nvSpPr>
         <p:spPr>
           <a:xfrm>
-            <a:off x="4800600" y="5123906"/>
+            <a:off x="914400" y="5132614"/>
             <a:ext cx="1136470" cy="191587"/>
           </a:xfrm>
           <a:prstGeom prst="flowChartDisplay">
@@ -36397,7 +36959,7 @@
         </p:nvSpPr>
         <p:spPr>
           <a:xfrm>
-            <a:off x="4800600" y="5453949"/>
+            <a:off x="4572000" y="5466806"/>
             <a:ext cx="1136470" cy="191587"/>
           </a:xfrm>
           <a:prstGeom prst="flowChartDisplay">
@@ -36429,12 +36991,20 @@
           <a:p>
             <a:pPr algn="ctr"/>
             <a:r>
+              <a:rPr lang="en-US" altLang="zh-CN" sz="1200" dirty="0">
+                <a:solidFill>
+                  <a:schemeClr val="tx1"/>
+                </a:solidFill>
+              </a:rPr>
+              <a:t>–</a:t>
+            </a:r>
+            <a:r>
               <a:rPr lang="en-US" sz="1200" dirty="0">
                 <a:solidFill>
                   <a:schemeClr val="tx1"/>
                 </a:solidFill>
               </a:rPr>
-              <a:t>- 0.011</a:t>
+              <a:t> 0.011</a:t>
             </a:r>
           </a:p>
         </p:txBody>
@@ -36453,7 +37023,7 @@
         </p:nvSpPr>
         <p:spPr>
           <a:xfrm>
-            <a:off x="5791200" y="3457511"/>
+            <a:off x="4191000" y="3447506"/>
             <a:ext cx="1136470" cy="191587"/>
           </a:xfrm>
           <a:prstGeom prst="flowChartDisplay">

</xml_diff>